<commit_message>
Menambahkan history pada navbar
</commit_message>
<xml_diff>
--- a/backend/project/PPTX/Python_presentation.pptx
+++ b/backend/project/PPTX/Python_presentation.pptx
@@ -3174,7 +3174,7 @@
           <a:lstStyle/>
           <a:p>
             <a:r>
-              <a:t>Slide 9: Python in Industry</a:t>
+              <a:t>Python Community and Resources</a:t>
             </a:r>
           </a:p>
         </p:txBody>
@@ -3196,7 +3196,7 @@
           <a:p>
             <a:r>
               <a:rPr b="1" sz="1800"/>
-              <a:t>Python is widely used in industry for tasks such as web development, data analysis, machine learning, automation, and more.</a:t>
+              <a:t>Python has a vibrant and supportive community with numerous forums, online resources, and tutorials available for help and learning. Engaging with the Python community can help in networking, learning new concepts, and solving coding challenges.</a:t>
             </a:r>
           </a:p>
         </p:txBody>
@@ -3228,7 +3228,7 @@
               <a:defRPr sz="1200"/>
             </a:pPr>
             <a:r>
-              <a:t>- https://www.techradar.com/best/best-uses-for-python</a:t>
+              <a:t>- Python community website: python.org/community, Python subreddit: reddit.com/r/python</a:t>
             </a:r>
           </a:p>
         </p:txBody>
@@ -3267,7 +3267,7 @@
           <a:lstStyle/>
           <a:p>
             <a:r>
-              <a:t>Slide 10: Conclusion</a:t>
+              <a:t>Conclusion</a:t>
             </a:r>
           </a:p>
         </p:txBody>
@@ -3289,7 +3289,7 @@
           <a:p>
             <a:r>
               <a:rPr b="1" sz="1800"/>
-              <a:t>Python is a versatile and powerful programming language with a large community of developers and plenty of resources for learning and development.</a:t>
+              <a:t>Python is a versatile and powerful programming language with a wide range of applications. Its simplicity, readability, and extensive library support make it a popular choice for developers worldwide.</a:t>
             </a:r>
           </a:p>
         </p:txBody>
@@ -3321,7 +3321,7 @@
               <a:defRPr sz="1200"/>
             </a:pPr>
             <a:r>
-              <a:t>- https://www.learnpython.org/</a:t>
+              <a:t>- Python summary: www.python.org/about</a:t>
             </a:r>
           </a:p>
         </p:txBody>
@@ -3360,7 +3360,7 @@
           <a:lstStyle/>
           <a:p>
             <a:r>
-              <a:t>Slide 1: Introduction to Python</a:t>
+              <a:t>Introduction to Python</a:t>
             </a:r>
           </a:p>
         </p:txBody>
@@ -3382,7 +3382,7 @@
           <a:p>
             <a:r>
               <a:rPr b="1" sz="1800"/>
-              <a:t>Python is a high-level programming language known for its simplicity and readability. It is widely used in various fields such as web development, data science, and automation.</a:t>
+              <a:t>Python is a high-level programming language known for its simple syntax and readability. It is widely used in various applications including web development, data analysis, artificial intelligence, and more.</a:t>
             </a:r>
           </a:p>
         </p:txBody>
@@ -3414,7 +3414,7 @@
               <a:defRPr sz="1200"/>
             </a:pPr>
             <a:r>
-              <a:t>- https://www.python.org/</a:t>
+              <a:t>- Python official website: www.python.org</a:t>
             </a:r>
           </a:p>
         </p:txBody>
@@ -3453,7 +3453,7 @@
           <a:lstStyle/>
           <a:p>
             <a:r>
-              <a:t>Slide 2: Python Basics</a:t>
+              <a:t>Python Features</a:t>
             </a:r>
           </a:p>
         </p:txBody>
@@ -3475,7 +3475,7 @@
           <a:p>
             <a:r>
               <a:rPr b="1" sz="1800"/>
-              <a:t>Python uses indentation to define code blocks and is dynamically typed. It supports both procedural and object-oriented programming paradigms.</a:t>
+              <a:t>Python has numerous features such as dynamic typing, automatic memory management, extensive standard library, and more. These features make Python a versatile and powerful language.</a:t>
             </a:r>
           </a:p>
         </p:txBody>
@@ -3507,7 +3507,7 @@
               <a:defRPr sz="1200"/>
             </a:pPr>
             <a:r>
-              <a:t>- https://realpython.com/python-beginner-tips/</a:t>
+              <a:t>- Python documentation: docs.python.org</a:t>
             </a:r>
           </a:p>
         </p:txBody>
@@ -3546,7 +3546,7 @@
           <a:lstStyle/>
           <a:p>
             <a:r>
-              <a:t>Slide 3: Data Types in Python</a:t>
+              <a:t>Python Data Types</a:t>
             </a:r>
           </a:p>
         </p:txBody>
@@ -3568,7 +3568,7 @@
           <a:p>
             <a:r>
               <a:rPr b="1" sz="1800"/>
-              <a:t>Python supports multiple data types such as integers, floats, strings, lists, tuples, dictionaries, and sets.</a:t>
+              <a:t>Python supports various data types including integers, floats, strings, lists, tuples, dictionaries, and more. Understanding data types is crucial for writing efficient and effective Python code.</a:t>
             </a:r>
           </a:p>
         </p:txBody>
@@ -3600,7 +3600,7 @@
               <a:defRPr sz="1200"/>
             </a:pPr>
             <a:r>
-              <a:t>- https://docs.python.org/3/library/stdtypes.html</a:t>
+              <a:t>- Python data types documentation: docs.python.org/library/stdtypes.html</a:t>
             </a:r>
           </a:p>
         </p:txBody>
@@ -3639,7 +3639,7 @@
           <a:lstStyle/>
           <a:p>
             <a:r>
-              <a:t>Slide 4: Control Flow in Python</a:t>
+              <a:t>Control Structures in Python</a:t>
             </a:r>
           </a:p>
         </p:txBody>
@@ -3661,7 +3661,7 @@
           <a:p>
             <a:r>
               <a:rPr b="1" sz="1800"/>
-              <a:t>Python uses if-elif-else statements for conditional execution and for loops, while loops for repetitive tasks.</a:t>
+              <a:t>Python provides control structures such as loops (for, while) and conditional statements (if, else, elif) for controlling the flow of a program. These structures help in making decisions and repeating tasks.</a:t>
             </a:r>
           </a:p>
         </p:txBody>
@@ -3693,7 +3693,7 @@
               <a:defRPr sz="1200"/>
             </a:pPr>
             <a:r>
-              <a:t>- https://docs.python.org/3/tutorial/controlflow.html</a:t>
+              <a:t>- Python control structures documentation: docs.python.org/tutorial/controlflow.html</a:t>
             </a:r>
           </a:p>
         </p:txBody>
@@ -3732,7 +3732,7 @@
           <a:lstStyle/>
           <a:p>
             <a:r>
-              <a:t>Slide 5: Functions in Python</a:t>
+              <a:t>Functions in Python</a:t>
             </a:r>
           </a:p>
         </p:txBody>
@@ -3754,7 +3754,7 @@
           <a:p>
             <a:r>
               <a:rPr b="1" sz="1800"/>
-              <a:t>Functions in Python are defined using the 'def' keyword and can return values using the 'return' statement.</a:t>
+              <a:t>Functions in Python allow us to encapsulate code for reusability and modularity. They help in organizing code and making it easier to manage and maintain.</a:t>
             </a:r>
           </a:p>
         </p:txBody>
@@ -3786,7 +3786,7 @@
               <a:defRPr sz="1200"/>
             </a:pPr>
             <a:r>
-              <a:t>- https://www.w3schools.com/python/python_functions.asp</a:t>
+              <a:t>- Python functions documentation: docs.python.org/tutorial/controlflow.html#defining-functions</a:t>
             </a:r>
           </a:p>
         </p:txBody>
@@ -3825,7 +3825,7 @@
           <a:lstStyle/>
           <a:p>
             <a:r>
-              <a:t>Slide 6: Python Libraries</a:t>
+              <a:t>Python Libraries</a:t>
             </a:r>
           </a:p>
         </p:txBody>
@@ -3847,7 +3847,7 @@
           <a:p>
             <a:r>
               <a:rPr b="1" sz="1800"/>
-              <a:t>Python has a rich ecosystem of libraries such as NumPy, pandas, matplotlib for data analysis, scikit-learn for machine learning, and Flask for web development.</a:t>
+              <a:t>Python has a vast collection of libraries such as NumPy, Pandas, Matplotlib, and TensorFlow that extend its functionality for specific tasks. These libraries make Python a popular choice for data analysis, machine learning, and more.</a:t>
             </a:r>
           </a:p>
         </p:txBody>
@@ -3879,7 +3879,7 @@
               <a:defRPr sz="1200"/>
             </a:pPr>
             <a:r>
-              <a:t>- https://numpy.org/</a:t>
+              <a:t>- Python libraries documentation: numpy.org, pandas.pydata.org, matplotlib.org, tensorflow.org</a:t>
             </a:r>
           </a:p>
         </p:txBody>
@@ -3918,7 +3918,7 @@
           <a:lstStyle/>
           <a:p>
             <a:r>
-              <a:t>Slide 7: File Handling in Python</a:t>
+              <a:t>Object-Oriented Programming in Python</a:t>
             </a:r>
           </a:p>
         </p:txBody>
@@ -3940,7 +3940,7 @@
           <a:p>
             <a:r>
               <a:rPr b="1" sz="1800"/>
-              <a:t>Python provides built-in functions to read from and write to files, making it easy to work with external data.</a:t>
+              <a:t>Python supports object-oriented programming principles such as encapsulation, inheritance, and polymorphism. Classes and objects are fundamental concepts in Python for building reusable and modular code.</a:t>
             </a:r>
           </a:p>
         </p:txBody>
@@ -3972,7 +3972,7 @@
               <a:defRPr sz="1200"/>
             </a:pPr>
             <a:r>
-              <a:t>- https://realpython.com/read-write-files-python/</a:t>
+              <a:t>- Python classes documentation: docs.python.org/tutorial/classes.html</a:t>
             </a:r>
           </a:p>
         </p:txBody>
@@ -4011,7 +4011,7 @@
           <a:lstStyle/>
           <a:p>
             <a:r>
-              <a:t>Slide 8: Error Handling in Python</a:t>
+              <a:t>Python Development Environments</a:t>
             </a:r>
           </a:p>
         </p:txBody>
@@ -4033,7 +4033,7 @@
           <a:p>
             <a:r>
               <a:rPr b="1" sz="1800"/>
-              <a:t>Python uses try-except blocks to handle exceptions and prevent programs from crashing when errors occur.</a:t>
+              <a:t>There are various IDEs (Integrated Development Environments) and text editors available for Python development such as PyCharm, Visual Studio Code, and Jupyter Notebook. Choosing the right environment can enhance productivity and efficiency in coding.</a:t>
             </a:r>
           </a:p>
         </p:txBody>
@@ -4065,7 +4065,7 @@
               <a:defRPr sz="1200"/>
             </a:pPr>
             <a:r>
-              <a:t>- https://docs.python.org/3/tutorial/errors.html</a:t>
+              <a:t>- PyCharm: jetbrains.com/pycharm, Visual Studio Code: code.visualstudio.com, Jupyter Notebook: jupyter.org</a:t>
             </a:r>
           </a:p>
         </p:txBody>

</xml_diff>